<commit_message>
Week 10 Version 2
</commit_message>
<xml_diff>
--- a/ws10.pptx
+++ b/ws10.pptx
@@ -259,7 +259,7 @@
               <a:pPr>
                 <a:defRPr/>
               </a:pPr>
-              <a:t>19/5/20</a:t>
+              <a:t>22/5/20</a:t>
             </a:fld>
             <a:endParaRPr lang="en-US"/>
           </a:p>
@@ -457,7 +457,7 @@
               <a:pPr>
                 <a:defRPr/>
               </a:pPr>
-              <a:t>19/5/20</a:t>
+              <a:t>22/5/20</a:t>
             </a:fld>
             <a:endParaRPr lang="en-US"/>
           </a:p>
@@ -1016,7 +1016,7 @@
             </a:r>
             <a:fld id="{34199234-A25A-904C-9B74-56A4A07707A6}" type="datetime4">
               <a:rPr lang="en-AU" smtClean="0"/>
-              <a:t>May 19, 2020</a:t>
+              <a:t>May 22, 2020</a:t>
             </a:fld>
             <a:endParaRPr lang="en-US" dirty="0"/>
           </a:p>
@@ -1328,7 +1328,7 @@
             </a:r>
             <a:fld id="{A9DEA08E-4CB3-E742-9AC2-43959A293033}" type="datetime4">
               <a:rPr lang="en-AU" smtClean="0"/>
-              <a:t>May 19, 2020</a:t>
+              <a:t>May 22, 2020</a:t>
             </a:fld>
             <a:endParaRPr lang="en-US" dirty="0"/>
           </a:p>
@@ -1631,7 +1631,7 @@
             </a:r>
             <a:fld id="{C36B4625-443B-BA4A-9C4D-9655F853EDD2}" type="datetime4">
               <a:rPr lang="en-AU" smtClean="0"/>
-              <a:t>May 19, 2020</a:t>
+              <a:t>May 22, 2020</a:t>
             </a:fld>
             <a:endParaRPr lang="en-US" dirty="0"/>
           </a:p>
@@ -2452,7 +2452,7 @@
                 </a:solidFill>
               </a:rPr>
               <a:pPr eaLnBrk="1" hangingPunct="1"/>
-              <a:t>May 19, 2020</a:t>
+              <a:t>May 22, 2020</a:t>
             </a:fld>
             <a:endParaRPr lang="en-US" sz="1200">
               <a:solidFill>
@@ -2922,7 +2922,6 @@
                         <a:rPr lang="en-US" sz="2000" b="0" dirty="0" smtClean="0"/>
                         <a:t>LAB</a:t>
                       </a:r>
-                      <a:endParaRPr lang="en-US" sz="2000" b="0" dirty="0" smtClean="0"/>
                     </a:p>
                   </a:txBody>
                   <a:tcPr marT="45726" marB="45726"/>
@@ -2991,11 +2990,7 @@
                       </a:r>
                       <a:r>
                         <a:rPr lang="en-US" sz="2000" b="0" baseline="0" dirty="0" smtClean="0"/>
-                        <a:t> </a:t>
-                      </a:r>
-                      <a:r>
-                        <a:rPr lang="en-US" sz="2000" b="0" baseline="0" dirty="0" smtClean="0"/>
-                        <a:t>from </a:t>
+                        <a:t> from </a:t>
                       </a:r>
                       <a:r>
                         <a:rPr lang="en-US" sz="2000" b="0" kern="1200" baseline="0" dirty="0" err="1" smtClean="0">
@@ -3038,14 +3033,6 @@
                         </a:rPr>
                         <a:t>c207 </a:t>
                       </a:r>
-                      <a:endParaRPr lang="en-US" sz="2000" b="0" kern="1200" baseline="0" dirty="0" smtClean="0">
-                        <a:solidFill>
-                          <a:srgbClr val="000090"/>
-                        </a:solidFill>
-                        <a:latin typeface="Courier"/>
-                        <a:ea typeface="+mn-ea"/>
-                        <a:cs typeface="Courier"/>
-                      </a:endParaRPr>
                     </a:p>
                     <a:p>
                       <a:pPr>
@@ -3111,11 +3098,7 @@
                       </a:pPr>
                       <a:r>
                         <a:rPr lang="en-US" sz="2000" b="0" baseline="0" dirty="0" smtClean="0"/>
-                        <a:t>   </a:t>
-                      </a:r>
-                      <a:r>
-                        <a:rPr lang="en-US" sz="2000" b="0" baseline="0" dirty="0" smtClean="0"/>
-                        <a:t>- download lab files from </a:t>
+                        <a:t>   - download lab files from </a:t>
                       </a:r>
                       <a:r>
                         <a:rPr lang="en-US" sz="2000" b="0" kern="1200" baseline="0" dirty="0" smtClean="0">
@@ -3229,13 +3212,8 @@
                       </a:pPr>
                       <a:r>
                         <a:rPr lang="en-US" sz="2000" b="0" baseline="0" dirty="0" smtClean="0"/>
-                        <a:t>Lab</a:t>
+                        <a:t>Lab: playing with hashing code </a:t>
                       </a:r>
-                      <a:r>
-                        <a:rPr lang="en-US" sz="2000" b="0" baseline="0" dirty="0" smtClean="0"/>
-                        <a:t>: playing with hashing code </a:t>
-                      </a:r>
-                      <a:endParaRPr lang="en-US" sz="2000" b="0" baseline="0" dirty="0" smtClean="0"/>
                     </a:p>
                     <a:p>
                       <a:pPr>
@@ -3342,7 +3320,7 @@
             </a:r>
             <a:fld id="{A9DEA08E-4CB3-E742-9AC2-43959A293033}" type="datetime4">
               <a:rPr lang="en-AU" smtClean="0"/>
-              <a:t>May 20, 2020</a:t>
+              <a:t>May 22, 2020</a:t>
             </a:fld>
             <a:endParaRPr lang="en-US" dirty="0"/>
           </a:p>
@@ -3434,48 +3412,34 @@
                 <a:latin typeface="Cambria Math"/>
                 <a:cs typeface="Cambria Math"/>
               </a:rPr>
-              <a:t>f</a:t>
+              <a:t>f(n)</a:t>
+            </a:r>
+            <a:r>
+              <a:rPr lang="en-US" sz="2200" dirty="0" smtClean="0"/>
+              <a:t> is </a:t>
             </a:r>
             <a:r>
               <a:rPr lang="en-US" sz="2000" i="1" dirty="0">
                 <a:latin typeface="Cambria Math"/>
                 <a:cs typeface="Cambria Math"/>
               </a:rPr>
-              <a:t>(</a:t>
+              <a:t>O(g(n))</a:t>
+            </a:r>
+            <a:r>
+              <a:rPr lang="en-US" sz="2200" dirty="0" smtClean="0"/>
+              <a:t>, or  </a:t>
+            </a:r>
+          </a:p>
+          <a:p>
+            <a:r>
+              <a:rPr lang="en-US" sz="2200" dirty="0" smtClean="0"/>
+              <a:t> </a:t>
             </a:r>
             <a:r>
               <a:rPr lang="en-US" sz="2000" i="1" dirty="0">
                 <a:latin typeface="Cambria Math"/>
                 <a:cs typeface="Cambria Math"/>
               </a:rPr>
-              <a:t>n)</a:t>
-            </a:r>
-            <a:r>
-              <a:rPr lang="en-US" sz="2200" dirty="0" smtClean="0"/>
-              <a:t> is </a:t>
-            </a:r>
-            <a:r>
-              <a:rPr lang="en-US" sz="2000" i="1" dirty="0">
-                <a:latin typeface="Cambria Math"/>
-                <a:cs typeface="Cambria Math"/>
-              </a:rPr>
-              <a:t>O(g(n))</a:t>
-            </a:r>
-            <a:r>
-              <a:rPr lang="en-US" sz="2200" dirty="0" smtClean="0"/>
-              <a:t>, or  </a:t>
-            </a:r>
-          </a:p>
-          <a:p>
-            <a:r>
-              <a:rPr lang="en-US" sz="2200" dirty="0" smtClean="0"/>
-              <a:t> </a:t>
-            </a:r>
-            <a:r>
-              <a:rPr lang="en-US" sz="2000" i="1" dirty="0">
-                <a:latin typeface="Cambria Math"/>
-                <a:cs typeface="Cambria Math"/>
-              </a:rPr>
               <a:t> </a:t>
             </a:r>
             <a:r>
@@ -3509,15 +3473,7 @@
             </a:r>
             <a:r>
               <a:rPr lang="en-US" sz="2200" dirty="0"/>
-              <a:t>(</a:t>
-            </a:r>
-            <a:r>
-              <a:rPr lang="en-US" sz="2200" dirty="0"/>
-              <a:t>t</a:t>
-            </a:r>
-            <a:r>
-              <a:rPr lang="en-US" sz="2200" dirty="0"/>
-              <a:t>hat</a:t>
+              <a:t>(that</a:t>
             </a:r>
             <a:r>
               <a:rPr lang="en-US" sz="2000" i="1" dirty="0" smtClean="0">
@@ -3573,6 +3529,36 @@
           </a:prstGeom>
         </p:spPr>
       </p:pic>
+      <p:sp>
+        <p:nvSpPr>
+          <p:cNvPr id="10" name="TextBox 9"/>
+          <p:cNvSpPr txBox="1"/>
+          <p:nvPr/>
+        </p:nvSpPr>
+        <p:spPr>
+          <a:xfrm>
+            <a:off x="215629" y="5040478"/>
+            <a:ext cx="8594725" cy="769441"/>
+          </a:xfrm>
+          <a:prstGeom prst="rect">
+            <a:avLst/>
+          </a:prstGeom>
+          <a:noFill/>
+        </p:spPr>
+        <p:txBody>
+          <a:bodyPr wrap="square" rtlCol="0">
+            <a:spAutoFit/>
+          </a:bodyPr>
+          <a:lstStyle/>
+          <a:p>
+            <a:r>
+              <a:rPr lang="en-US" sz="2200" dirty="0" smtClean="0"/>
+              <a:t>Other exercises: review exercises and solution for Workshop Week 3,</a:t>
+            </a:r>
+            <a:endParaRPr lang="en-US" sz="2200" dirty="0"/>
+          </a:p>
+        </p:txBody>
+      </p:sp>
     </p:spTree>
     <p:extLst>
       <p:ext uri="{BB962C8B-B14F-4D97-AF65-F5344CB8AC3E}">
@@ -3625,11 +3611,7 @@
           <a:p>
             <a:r>
               <a:rPr lang="en-US" sz="2400" dirty="0" smtClean="0"/>
-              <a:t>R2</a:t>
-            </a:r>
-            <a:r>
-              <a:rPr lang="en-US" sz="2400" dirty="0" smtClean="0"/>
-              <a:t>: </a:t>
+              <a:t>R2: </a:t>
             </a:r>
             <a:r>
               <a:rPr lang="en-US" sz="2400" dirty="0" smtClean="0">
@@ -3715,7 +3697,7 @@
             </a:r>
             <a:fld id="{A9DEA08E-4CB3-E742-9AC2-43959A293033}" type="datetime4">
               <a:rPr lang="en-AU" smtClean="0"/>
-              <a:t>May 19, 2020</a:t>
+              <a:t>May 22, 2020</a:t>
             </a:fld>
             <a:endParaRPr lang="en-US" dirty="0"/>
           </a:p>
@@ -3785,7 +3767,7 @@
         <p:spPr>
           <a:xfrm>
             <a:off x="127802" y="739642"/>
-            <a:ext cx="9016197" cy="4154983"/>
+            <a:ext cx="9016197" cy="4832092"/>
           </a:xfrm>
           <a:prstGeom prst="rect">
             <a:avLst/>
@@ -3963,15 +3945,17 @@
             </a:r>
             <a:r>
               <a:rPr lang="en-US" sz="2200" dirty="0" smtClean="0"/>
-              <a:t> Supposing T(1)=1, solve the following using substitution </a:t>
-            </a:r>
-            <a:r>
-              <a:rPr lang="en-US" sz="2200" i="1" dirty="0" smtClean="0"/>
-              <a:t>and </a:t>
-            </a:r>
-            <a:r>
-              <a:rPr lang="en-US" sz="2200" dirty="0" smtClean="0"/>
-              <a:t>using master theorem when possible: </a:t>
+              <a:t> </a:t>
+            </a:r>
+            <a:r>
+              <a:rPr lang="en-US" sz="2200" dirty="0"/>
+              <a:t>Solve the following recurrence relations. Give both a closed</a:t>
+            </a:r>
+          </a:p>
+          <a:p>
+            <a:r>
+              <a:rPr lang="en-US" sz="2200" dirty="0"/>
+              <a:t>form expression in terms of n and a Big-Theta bound.</a:t>
             </a:r>
           </a:p>
           <a:p>
@@ -3983,7 +3967,7 @@
                 <a:latin typeface="Cambria Math"/>
                 <a:cs typeface="Cambria Math"/>
               </a:rPr>
-              <a:t>T(n)= 3T(n-1) + 1</a:t>
+              <a:t>T(n)= T(n/2)+1,  T(1)= 1</a:t>
             </a:r>
           </a:p>
           <a:p>
@@ -3995,10 +3979,64 @@
                 <a:latin typeface="Cambria Math"/>
                 <a:cs typeface="Cambria Math"/>
               </a:rPr>
-              <a:t>T(n)= T(n/3) +1      </a:t>
-            </a:r>
-          </a:p>
-          <a:p>
+              <a:t>T(n)= T(n-1) + n/5, T(0)= 0</a:t>
+            </a:r>
+          </a:p>
+          <a:p>
+            <a:pPr marL="457200" indent="-457200">
+              <a:buAutoNum type="alphaLcParenR"/>
+            </a:pPr>
+            <a:r>
+              <a:rPr lang="en-US" sz="2200" i="1" dirty="0" smtClean="0">
+                <a:latin typeface="Cambria Math"/>
+                <a:cs typeface="Cambria Math"/>
+              </a:rPr>
+              <a:t>T(n)= 3T(n-1) + 1,   T(1)=1</a:t>
+            </a:r>
+          </a:p>
+          <a:p>
+            <a:pPr marL="457200" indent="-457200">
+              <a:buAutoNum type="alphaLcParenR"/>
+            </a:pPr>
+            <a:r>
+              <a:rPr lang="en-US" sz="2200" i="1" dirty="0" smtClean="0">
+                <a:latin typeface="Cambria Math"/>
+                <a:cs typeface="Cambria Math"/>
+              </a:rPr>
+              <a:t>T(n)= T(n/3) +1,   T(1)= 1      </a:t>
+            </a:r>
+          </a:p>
+          <a:p>
+            <a:endParaRPr lang="en-US" sz="2200" dirty="0"/>
+          </a:p>
+        </p:txBody>
+      </p:sp>
+      <p:sp>
+        <p:nvSpPr>
+          <p:cNvPr id="8" name="TextBox 7"/>
+          <p:cNvSpPr txBox="1"/>
+          <p:nvPr/>
+        </p:nvSpPr>
+        <p:spPr>
+          <a:xfrm>
+            <a:off x="215629" y="5558879"/>
+            <a:ext cx="8594725" cy="769441"/>
+          </a:xfrm>
+          <a:prstGeom prst="rect">
+            <a:avLst/>
+          </a:prstGeom>
+          <a:noFill/>
+        </p:spPr>
+        <p:txBody>
+          <a:bodyPr wrap="square" rtlCol="0">
+            <a:spAutoFit/>
+          </a:bodyPr>
+          <a:lstStyle/>
+          <a:p>
+            <a:r>
+              <a:rPr lang="en-US" sz="2200" dirty="0" smtClean="0"/>
+              <a:t>Other exercises: review exercises and solution for Workshop Week 3, Workshop Week 8 (master theorem)</a:t>
+            </a:r>
             <a:endParaRPr lang="en-US" sz="2200" dirty="0"/>
           </a:p>
         </p:txBody>
@@ -4055,11 +4093,7 @@
           <a:p>
             <a:r>
               <a:rPr lang="en-US" sz="2400" dirty="0" smtClean="0"/>
-              <a:t>R3</a:t>
-            </a:r>
-            <a:r>
-              <a:rPr lang="en-US" sz="2400" dirty="0" smtClean="0"/>
-              <a:t>: </a:t>
+              <a:t>R3: </a:t>
             </a:r>
             <a:r>
               <a:rPr lang="en-US" sz="2400" b="0" dirty="0" smtClean="0">
@@ -4073,11 +4107,7 @@
             </a:r>
             <a:r>
               <a:rPr lang="en-US" sz="2400" dirty="0" smtClean="0"/>
-              <a:t>: exhaustive</a:t>
-            </a:r>
-            <a:r>
-              <a:rPr lang="en-US" sz="2400" dirty="0" smtClean="0"/>
-              <a:t> string search, knapsack  </a:t>
+              <a:t>: exhaustive string search, knapsack  </a:t>
             </a:r>
             <a:endParaRPr lang="en-US" sz="2400" dirty="0"/>
           </a:p>
@@ -4129,7 +4159,7 @@
             </a:r>
             <a:fld id="{A9DEA08E-4CB3-E742-9AC2-43959A293033}" type="datetime4">
               <a:rPr lang="en-AU" smtClean="0"/>
-              <a:t>May 20, 2020</a:t>
+              <a:t>May 22, 2020</a:t>
             </a:fld>
             <a:endParaRPr lang="en-US" dirty="0"/>
           </a:p>
@@ -4199,7 +4229,7 @@
         <p:spPr>
           <a:xfrm>
             <a:off x="127802" y="739642"/>
-            <a:ext cx="9016197" cy="2123658"/>
+            <a:ext cx="9016197" cy="2462212"/>
           </a:xfrm>
           <a:prstGeom prst="rect">
             <a:avLst/>
@@ -4241,6 +4271,9 @@
             </a:r>
           </a:p>
           <a:p>
+            <a:endParaRPr lang="en-US" sz="2200" b="1" dirty="0" smtClean="0"/>
+          </a:p>
+          <a:p>
             <a:pPr marL="342900" indent="-342900">
               <a:buFont typeface="Arial"/>
               <a:buChar char="•"/>
@@ -4248,6 +4281,36 @@
             <a:endParaRPr lang="en-US" sz="2200" dirty="0"/>
           </a:p>
           <a:p>
+            <a:endParaRPr lang="en-US" sz="2200" dirty="0"/>
+          </a:p>
+        </p:txBody>
+      </p:sp>
+      <p:sp>
+        <p:nvSpPr>
+          <p:cNvPr id="8" name="TextBox 7"/>
+          <p:cNvSpPr txBox="1"/>
+          <p:nvPr/>
+        </p:nvSpPr>
+        <p:spPr>
+          <a:xfrm>
+            <a:off x="215629" y="2524300"/>
+            <a:ext cx="8594725" cy="769441"/>
+          </a:xfrm>
+          <a:prstGeom prst="rect">
+            <a:avLst/>
+          </a:prstGeom>
+          <a:noFill/>
+        </p:spPr>
+        <p:txBody>
+          <a:bodyPr wrap="square" rtlCol="0">
+            <a:spAutoFit/>
+          </a:bodyPr>
+          <a:lstStyle/>
+          <a:p>
+            <a:r>
+              <a:rPr lang="en-US" sz="2200" dirty="0" smtClean="0"/>
+              <a:t>Other exercises: review exercises and solution for Workshop Week 4.</a:t>
+            </a:r>
             <a:endParaRPr lang="en-US" sz="2200" dirty="0"/>
           </a:p>
         </p:txBody>
@@ -4304,11 +4367,7 @@
           <a:p>
             <a:r>
               <a:rPr lang="en-US" sz="2400" dirty="0" smtClean="0"/>
-              <a:t>R4</a:t>
-            </a:r>
-            <a:r>
-              <a:rPr lang="en-US" sz="2400" dirty="0" smtClean="0"/>
-              <a:t>: graphs</a:t>
+              <a:t>R4: graphs</a:t>
             </a:r>
             <a:endParaRPr lang="en-US" sz="2400" dirty="0"/>
           </a:p>
@@ -4360,7 +4419,7 @@
             </a:r>
             <a:fld id="{A9DEA08E-4CB3-E742-9AC2-43959A293033}" type="datetime4">
               <a:rPr lang="en-AU" smtClean="0"/>
-              <a:t>May 20, 2020</a:t>
+              <a:t>May 22, 2020</a:t>
             </a:fld>
             <a:endParaRPr lang="en-US" dirty="0"/>
           </a:p>
@@ -4430,7 +4489,7 @@
         <p:spPr>
           <a:xfrm>
             <a:off x="127802" y="739642"/>
-            <a:ext cx="9016197" cy="1785104"/>
+            <a:ext cx="9016197" cy="4154983"/>
           </a:xfrm>
           <a:prstGeom prst="rect">
             <a:avLst/>
@@ -4475,8 +4534,18 @@
                 <a:latin typeface="Courier"/>
                 <a:cs typeface="Courier"/>
               </a:rPr>
-              <a:t>07</a:t>
-            </a:r>
+              <a:t>07.pdf</a:t>
+            </a:r>
+            <a:r>
+              <a:rPr lang="en-US" sz="2200" dirty="0" smtClean="0"/>
+              <a:t>: DFS and BFS, topological sort</a:t>
+            </a:r>
+          </a:p>
+          <a:p>
+            <a:pPr marL="342900" indent="-342900">
+              <a:buFont typeface="Arial"/>
+              <a:buChar char="•"/>
+            </a:pPr>
             <a:r>
               <a:rPr lang="en-US" sz="2200" dirty="0">
                 <a:solidFill>
@@ -4485,11 +4554,31 @@
                 <a:latin typeface="Courier"/>
                 <a:cs typeface="Courier"/>
               </a:rPr>
-              <a:t>.pdf</a:t>
+              <a:t>08.pdf</a:t>
             </a:r>
             <a:r>
               <a:rPr lang="en-US" sz="2200" dirty="0" smtClean="0"/>
-              <a:t>: DFS and BFS, topological sort</a:t>
+              <a:t> : Prim &amp; </a:t>
+            </a:r>
+            <a:r>
+              <a:rPr lang="en-US" sz="2200" dirty="0" err="1" smtClean="0"/>
+              <a:t>Dijkstra</a:t>
+            </a:r>
+            <a:endParaRPr lang="en-US" sz="2200" dirty="0" smtClean="0"/>
+          </a:p>
+          <a:p>
+            <a:endParaRPr lang="en-US" sz="2200" b="1" dirty="0" smtClean="0"/>
+          </a:p>
+          <a:p>
+            <a:r>
+              <a:rPr lang="en-US" sz="2200" b="1" dirty="0" smtClean="0"/>
+              <a:t>Exercises:</a:t>
+            </a:r>
+          </a:p>
+          <a:p>
+            <a:r>
+              <a:rPr lang="en-US" sz="2200" dirty="0" smtClean="0"/>
+              <a:t>Review exercises and solution in Workshops:</a:t>
             </a:r>
           </a:p>
           <a:p>
@@ -4498,33 +4587,65 @@
               <a:buChar char="•"/>
             </a:pPr>
             <a:r>
-              <a:rPr lang="en-US" sz="2200" dirty="0">
-                <a:solidFill>
-                  <a:srgbClr val="0000FF"/>
-                </a:solidFill>
-                <a:latin typeface="Courier"/>
-                <a:cs typeface="Courier"/>
-              </a:rPr>
-              <a:t>08.pdf</a:t>
-            </a:r>
-            <a:r>
               <a:rPr lang="en-US" sz="2200" dirty="0" smtClean="0"/>
-              <a:t> : Prim &amp; </a:t>
+              <a:t>graphs concepts: Workshop Week 4</a:t>
+            </a:r>
+          </a:p>
+          <a:p>
+            <a:pPr marL="342900" indent="-342900">
+              <a:buFont typeface="Arial"/>
+              <a:buChar char="•"/>
+            </a:pPr>
+            <a:r>
+              <a:rPr lang="en-US" sz="2200" dirty="0" smtClean="0"/>
+              <a:t>DFS, BFS: Workshop Week 5 [Week 5 according to the numbering in our subject’s </a:t>
+            </a:r>
+            <a:r>
+              <a:rPr lang="en-US" sz="2200" dirty="0" err="1" smtClean="0"/>
+              <a:t>LMS.Modules</a:t>
+            </a:r>
+            <a:r>
+              <a:rPr lang="en-US" sz="2200" dirty="0" smtClean="0"/>
+              <a:t>, and is week 6 in </a:t>
+            </a:r>
+            <a:r>
+              <a:rPr lang="en-US" sz="2200" dirty="0" err="1" smtClean="0"/>
+              <a:t>uni’s</a:t>
+            </a:r>
+            <a:r>
+              <a:rPr lang="en-US" sz="2200" dirty="0" smtClean="0"/>
+              <a:t> calendar)]</a:t>
+            </a:r>
+          </a:p>
+          <a:p>
+            <a:pPr marL="342900" indent="-342900">
+              <a:buFont typeface="Arial"/>
+              <a:buChar char="•"/>
+            </a:pPr>
+            <a:r>
+              <a:rPr lang="en-US" sz="2200" dirty="0" smtClean="0"/>
+              <a:t>Topological Sort: Workshop Week 6</a:t>
+            </a:r>
+          </a:p>
+          <a:p>
+            <a:pPr marL="342900" indent="-342900">
+              <a:buFont typeface="Arial"/>
+              <a:buChar char="•"/>
+            </a:pPr>
+            <a:r>
+              <a:rPr lang="en-US" sz="2200" dirty="0" smtClean="0"/>
+              <a:t>Prim &amp; </a:t>
             </a:r>
             <a:r>
               <a:rPr lang="en-US" sz="2200" dirty="0" err="1" smtClean="0"/>
               <a:t>Dijkstra</a:t>
             </a:r>
-            <a:endParaRPr lang="en-US" sz="2200" dirty="0" smtClean="0"/>
-          </a:p>
-          <a:p>
-            <a:endParaRPr lang="en-US" sz="2200" b="1" dirty="0" smtClean="0"/>
-          </a:p>
-          <a:p>
-            <a:r>
-              <a:rPr lang="en-US" sz="2200" b="1" dirty="0" smtClean="0"/>
-              <a:t>Exercises:</a:t>
-            </a:r>
+            <a:r>
+              <a:rPr lang="en-US" sz="2200" dirty="0" smtClean="0"/>
+              <a:t>: Workshop Week 5, Week 6</a:t>
+            </a:r>
+          </a:p>
+          <a:p>
             <a:endParaRPr lang="en-US" sz="2200" dirty="0"/>
           </a:p>
         </p:txBody>
@@ -4581,11 +4702,7 @@
           <a:p>
             <a:r>
               <a:rPr lang="en-US" sz="2400" dirty="0" smtClean="0"/>
-              <a:t>R5</a:t>
-            </a:r>
-            <a:r>
-              <a:rPr lang="en-US" sz="2400" dirty="0" smtClean="0"/>
-              <a:t>: Sorting algorithms </a:t>
+              <a:t>R5: Sorting algorithms </a:t>
             </a:r>
             <a:endParaRPr lang="en-US" sz="2400" dirty="0"/>
           </a:p>
@@ -4637,7 +4754,7 @@
             </a:r>
             <a:fld id="{A9DEA08E-4CB3-E742-9AC2-43959A293033}" type="datetime4">
               <a:rPr lang="en-AU" smtClean="0"/>
-              <a:t>May 20, 2020</a:t>
+              <a:t>May 22, 2020</a:t>
             </a:fld>
             <a:endParaRPr lang="en-US" dirty="0"/>
           </a:p>
@@ -4764,27 +4881,7 @@
                 <a:latin typeface="Courier"/>
                 <a:cs typeface="Courier"/>
               </a:rPr>
-              <a:t>12.</a:t>
-            </a:r>
-            <a:r>
-              <a:rPr lang="en-US" sz="2200" dirty="0">
-                <a:solidFill>
-                  <a:srgbClr val="0000FF"/>
-                </a:solidFill>
-                <a:latin typeface="Courier"/>
-                <a:cs typeface="Courier"/>
-              </a:rPr>
-              <a:t>p</a:t>
-            </a:r>
-            <a:r>
-              <a:rPr lang="en-US" sz="2200" dirty="0">
-                <a:solidFill>
-                  <a:srgbClr val="0000FF"/>
-                </a:solidFill>
-                <a:latin typeface="Courier"/>
-                <a:cs typeface="Courier"/>
-              </a:rPr>
-              <a:t>df</a:t>
+              <a:t>12.pdf</a:t>
             </a:r>
             <a:r>
               <a:rPr lang="en-US" sz="2200" dirty="0" smtClean="0"/>
@@ -4885,6 +4982,36 @@
             </a:r>
           </a:p>
           <a:p>
+            <a:endParaRPr lang="en-US" sz="2200" dirty="0"/>
+          </a:p>
+        </p:txBody>
+      </p:sp>
+      <p:sp>
+        <p:nvSpPr>
+          <p:cNvPr id="8" name="TextBox 7"/>
+          <p:cNvSpPr txBox="1"/>
+          <p:nvPr/>
+        </p:nvSpPr>
+        <p:spPr>
+          <a:xfrm>
+            <a:off x="215629" y="5541812"/>
+            <a:ext cx="8594725" cy="769441"/>
+          </a:xfrm>
+          <a:prstGeom prst="rect">
+            <a:avLst/>
+          </a:prstGeom>
+          <a:noFill/>
+        </p:spPr>
+        <p:txBody>
+          <a:bodyPr wrap="square" rtlCol="0">
+            <a:spAutoFit/>
+          </a:bodyPr>
+          <a:lstStyle/>
+          <a:p>
+            <a:r>
+              <a:rPr lang="en-US" sz="2200" dirty="0" smtClean="0"/>
+              <a:t>Other exercises: review exercises and solution for Workshop Week 7.</a:t>
+            </a:r>
             <a:endParaRPr lang="en-US" sz="2200" dirty="0"/>
           </a:p>
         </p:txBody>
@@ -4941,11 +5068,7 @@
           <a:p>
             <a:r>
               <a:rPr lang="en-US" sz="2400" dirty="0" smtClean="0"/>
-              <a:t>R6</a:t>
-            </a:r>
-            <a:r>
-              <a:rPr lang="en-US" sz="2400" dirty="0" smtClean="0"/>
-              <a:t>: Binary Heap (</a:t>
+              <a:t>R6: Binary Heap (</a:t>
             </a:r>
             <a:r>
               <a:rPr lang="en-US" sz="2400" b="0" dirty="0" smtClean="0">
@@ -5008,7 +5131,7 @@
             </a:r>
             <a:fld id="{A9DEA08E-4CB3-E742-9AC2-43959A293033}" type="datetime4">
               <a:rPr lang="en-AU" smtClean="0"/>
-              <a:t>May 20, 2020</a:t>
+              <a:t>May 22, 2020</a:t>
             </a:fld>
             <a:endParaRPr lang="en-US" dirty="0"/>
           </a:p>
@@ -5157,6 +5280,36 @@
             </a:r>
           </a:p>
           <a:p>
+            <a:endParaRPr lang="en-US" sz="2200" dirty="0"/>
+          </a:p>
+        </p:txBody>
+      </p:sp>
+      <p:sp>
+        <p:nvSpPr>
+          <p:cNvPr id="8" name="TextBox 7"/>
+          <p:cNvSpPr txBox="1"/>
+          <p:nvPr/>
+        </p:nvSpPr>
+        <p:spPr>
+          <a:xfrm>
+            <a:off x="215629" y="5040478"/>
+            <a:ext cx="8594725" cy="769441"/>
+          </a:xfrm>
+          <a:prstGeom prst="rect">
+            <a:avLst/>
+          </a:prstGeom>
+          <a:noFill/>
+        </p:spPr>
+        <p:txBody>
+          <a:bodyPr wrap="square" rtlCol="0">
+            <a:spAutoFit/>
+          </a:bodyPr>
+          <a:lstStyle/>
+          <a:p>
+            <a:r>
+              <a:rPr lang="en-US" sz="2200" dirty="0" smtClean="0"/>
+              <a:t>Other exercises: review exercises and solution for Workshop Week 8.</a:t>
+            </a:r>
             <a:endParaRPr lang="en-US" sz="2200" dirty="0"/>
           </a:p>
         </p:txBody>
@@ -5213,11 +5366,7 @@
           <a:p>
             <a:r>
               <a:rPr lang="en-US" sz="2400" dirty="0" smtClean="0"/>
-              <a:t>R7</a:t>
-            </a:r>
-            <a:r>
-              <a:rPr lang="en-US" sz="2400" dirty="0" smtClean="0"/>
-              <a:t>: Search Trees (</a:t>
+              <a:t>R7: Search Trees (</a:t>
             </a:r>
             <a:r>
               <a:rPr lang="en-US" sz="2400" b="0" dirty="0" smtClean="0">
@@ -5280,7 +5429,7 @@
             </a:r>
             <a:fld id="{A9DEA08E-4CB3-E742-9AC2-43959A293033}" type="datetime4">
               <a:rPr lang="en-AU" smtClean="0"/>
-              <a:t>May 20, 2020</a:t>
+              <a:t>May 22, 2020</a:t>
             </a:fld>
             <a:endParaRPr lang="en-US" dirty="0"/>
           </a:p>
@@ -5433,6 +5582,58 @@
                 <a:cs typeface="Courier"/>
               </a:rPr>
               <a:t>TREBALNCD </a:t>
+            </a:r>
+          </a:p>
+          <a:p>
+            <a:endParaRPr lang="en-US" sz="2200" dirty="0"/>
+          </a:p>
+        </p:txBody>
+      </p:sp>
+      <p:sp>
+        <p:nvSpPr>
+          <p:cNvPr id="8" name="TextBox 7"/>
+          <p:cNvSpPr txBox="1"/>
+          <p:nvPr/>
+        </p:nvSpPr>
+        <p:spPr>
+          <a:xfrm>
+            <a:off x="127802" y="4271037"/>
+            <a:ext cx="8594725" cy="1446550"/>
+          </a:xfrm>
+          <a:prstGeom prst="rect">
+            <a:avLst/>
+          </a:prstGeom>
+          <a:noFill/>
+        </p:spPr>
+        <p:txBody>
+          <a:bodyPr wrap="square" rtlCol="0">
+            <a:spAutoFit/>
+          </a:bodyPr>
+          <a:lstStyle/>
+          <a:p>
+            <a:r>
+              <a:rPr lang="en-US" sz="2200" dirty="0" smtClean="0"/>
+              <a:t>Other exercises: review exercises and solution for Workshops:</a:t>
+            </a:r>
+          </a:p>
+          <a:p>
+            <a:r>
+              <a:rPr lang="en-US" sz="2200" dirty="0"/>
+              <a:t> </a:t>
+            </a:r>
+            <a:r>
+              <a:rPr lang="en-US" sz="2200" dirty="0" smtClean="0"/>
+              <a:t>   Binary Trees &amp; BST: Workshop Week 6</a:t>
+            </a:r>
+          </a:p>
+          <a:p>
+            <a:r>
+              <a:rPr lang="en-US" sz="2200" dirty="0"/>
+              <a:t> </a:t>
+            </a:r>
+            <a:r>
+              <a:rPr lang="en-US" sz="2200" dirty="0" smtClean="0"/>
+              <a:t>   AVL &amp; 2-3 Trees: Workshop Week 8</a:t>
             </a:r>
           </a:p>
           <a:p>
@@ -5492,11 +5693,7 @@
           <a:p>
             <a:r>
               <a:rPr lang="en-US" sz="2400" dirty="0" smtClean="0"/>
-              <a:t>R8</a:t>
-            </a:r>
-            <a:r>
-              <a:rPr lang="en-US" sz="2400" dirty="0" smtClean="0"/>
-              <a:t>: Hashing</a:t>
+              <a:t>R8: Hashing</a:t>
             </a:r>
             <a:endParaRPr lang="en-US" sz="2400" dirty="0"/>
           </a:p>
@@ -5548,7 +5745,7 @@
             </a:r>
             <a:fld id="{A9DEA08E-4CB3-E742-9AC2-43959A293033}" type="datetime4">
               <a:rPr lang="en-AU" smtClean="0"/>
-              <a:t>May 20, 2020</a:t>
+              <a:t>May 22, 2020</a:t>
             </a:fld>
             <a:endParaRPr lang="en-US" dirty="0"/>
           </a:p>
@@ -5660,7 +5857,11 @@
             </a:r>
             <a:r>
               <a:rPr lang="en-US" sz="2200" b="1" dirty="0" smtClean="0"/>
-              <a:t>xercises:</a:t>
+              <a:t>xercises: </a:t>
+            </a:r>
+            <a:r>
+              <a:rPr lang="en-US" sz="2200" dirty="0" smtClean="0"/>
+              <a:t>Workshop Week 9</a:t>
             </a:r>
             <a:endParaRPr lang="en-US" sz="2200" dirty="0"/>
           </a:p>
@@ -5718,11 +5919,7 @@
           <a:p>
             <a:r>
               <a:rPr lang="en-US" sz="2400" dirty="0" smtClean="0"/>
-              <a:t>R9</a:t>
-            </a:r>
-            <a:r>
-              <a:rPr lang="en-US" sz="2400" dirty="0" smtClean="0"/>
-              <a:t>: Huffman Coding </a:t>
+              <a:t>R9: Huffman Coding </a:t>
             </a:r>
             <a:endParaRPr lang="en-US" sz="2400" dirty="0"/>
           </a:p>
@@ -5774,7 +5971,7 @@
             </a:r>
             <a:fld id="{A9DEA08E-4CB3-E742-9AC2-43959A293033}" type="datetime4">
               <a:rPr lang="en-AU" smtClean="0"/>
-              <a:t>May 20, 2020</a:t>
+              <a:t>May 22, 2020</a:t>
             </a:fld>
             <a:endParaRPr lang="en-US" dirty="0"/>
           </a:p>
@@ -5886,7 +6083,11 @@
             </a:r>
             <a:r>
               <a:rPr lang="en-US" sz="2200" b="1" dirty="0" smtClean="0"/>
-              <a:t>xercises:</a:t>
+              <a:t>xercises: </a:t>
+            </a:r>
+            <a:r>
+              <a:rPr lang="en-US" sz="2200" dirty="0" smtClean="0"/>
+              <a:t>Workshop Week 9.</a:t>
             </a:r>
             <a:endParaRPr lang="en-US" sz="2200" dirty="0"/>
           </a:p>
@@ -5944,7 +6145,7 @@
           <a:p>
             <a:r>
               <a:rPr lang="en-US" sz="2400" dirty="0" smtClean="0"/>
-              <a:t>Anything missing in our list of revision? </a:t>
+              <a:t>Any topics missing in our revision list? </a:t>
             </a:r>
             <a:endParaRPr lang="en-US" sz="2400" dirty="0"/>
           </a:p>
@@ -5996,7 +6197,7 @@
             </a:r>
             <a:fld id="{A9DEA08E-4CB3-E742-9AC2-43959A293033}" type="datetime4">
               <a:rPr lang="en-AU" smtClean="0"/>
-              <a:t>May 20, 2020</a:t>
+              <a:t>May 22, 2020</a:t>
             </a:fld>
             <a:endParaRPr lang="en-US" dirty="0"/>
           </a:p>
@@ -6066,7 +6267,7 @@
         <p:spPr>
           <a:xfrm>
             <a:off x="127802" y="739642"/>
-            <a:ext cx="9016197" cy="1785104"/>
+            <a:ext cx="9016197" cy="2123658"/>
           </a:xfrm>
           <a:prstGeom prst="rect">
             <a:avLst/>
@@ -6091,8 +6292,23 @@
             </a:pPr>
             <a:r>
               <a:rPr lang="en-US" sz="2200" dirty="0" smtClean="0"/>
-              <a:t>stacks and queues, priority queues</a:t>
-            </a:r>
+              <a:t>stacks and queues, arrays and linked lists [Workshop week 2]</a:t>
+            </a:r>
+          </a:p>
+          <a:p>
+            <a:pPr marL="342900" indent="-342900">
+              <a:buFont typeface="Arial"/>
+              <a:buChar char="•"/>
+            </a:pPr>
+            <a:r>
+              <a:rPr lang="en-US" sz="2200" dirty="0" smtClean="0"/>
+              <a:t>priority </a:t>
+            </a:r>
+            <a:r>
+              <a:rPr lang="en-US" sz="2200" dirty="0" smtClean="0"/>
+              <a:t>queues? </a:t>
+            </a:r>
+            <a:endParaRPr lang="en-US" sz="2200" dirty="0" smtClean="0"/>
           </a:p>
           <a:p>
             <a:pPr marL="342900" indent="-342900">
@@ -6217,7 +6433,7 @@
             </a:r>
             <a:fld id="{A9DEA08E-4CB3-E742-9AC2-43959A293033}" type="datetime4">
               <a:rPr lang="en-AU" smtClean="0"/>
-              <a:t>May 19, 2020</a:t>
+              <a:t>May 22, 2020</a:t>
             </a:fld>
             <a:endParaRPr lang="en-US" dirty="0"/>
           </a:p>
@@ -6515,7 +6731,7 @@
             </a:r>
             <a:fld id="{A9DEA08E-4CB3-E742-9AC2-43959A293033}" type="datetime4">
               <a:rPr lang="en-AU" smtClean="0"/>
-              <a:t>May 19, 2020</a:t>
+              <a:t>May 22, 2020</a:t>
             </a:fld>
             <a:endParaRPr lang="en-US" dirty="0"/>
           </a:p>
@@ -6905,7 +7121,7 @@
             </a:r>
             <a:fld id="{A9DEA08E-4CB3-E742-9AC2-43959A293033}" type="datetime4">
               <a:rPr lang="en-AU" smtClean="0"/>
-              <a:t>May 19, 2020</a:t>
+              <a:t>May 22, 2020</a:t>
             </a:fld>
             <a:endParaRPr lang="en-US" dirty="0"/>
           </a:p>
@@ -7043,7 +7259,7 @@
         <p:spPr>
           <a:xfrm>
             <a:off x="265113" y="641787"/>
-            <a:ext cx="8623300" cy="4800600"/>
+            <a:ext cx="8623300" cy="5998726"/>
           </a:xfrm>
         </p:spPr>
         <p:txBody>
@@ -7051,30 +7267,77 @@
           <a:lstStyle/>
           <a:p>
             <a:pPr marL="0" indent="0">
+              <a:spcBef>
+                <a:spcPts val="800"/>
+              </a:spcBef>
               <a:buNone/>
             </a:pPr>
             <a:r>
-              <a:rPr lang="en-US" sz="2400" dirty="0" smtClean="0"/>
-              <a:t>Huffman </a:t>
-            </a:r>
-            <a:r>
-              <a:rPr lang="en-US" sz="2400" dirty="0" smtClean="0"/>
-              <a:t>Coding, encoding and </a:t>
-            </a:r>
-            <a:r>
-              <a:rPr lang="en-US" sz="2400" dirty="0" smtClean="0"/>
-              <a:t>decoding</a:t>
+              <a:rPr lang="en-US" sz="2200" dirty="0" smtClean="0"/>
+              <a:t>Huffman Coding, encoding and decoding</a:t>
             </a:r>
           </a:p>
           <a:p>
             <a:pPr marL="0" indent="0">
+              <a:spcBef>
+                <a:spcPts val="800"/>
+              </a:spcBef>
               <a:buNone/>
             </a:pPr>
             <a:r>
-              <a:rPr lang="en-US" sz="2400" dirty="0" smtClean="0"/>
-              <a:t>Build Huffman code for [ a:3, b:4, c:2, d:4, e:7 ]</a:t>
-            </a:r>
-            <a:endParaRPr lang="en-US" sz="2400" dirty="0"/>
+              <a:rPr lang="en-US" sz="2200" dirty="0" smtClean="0"/>
+              <a:t>Build Huffman code </a:t>
+            </a:r>
+            <a:r>
+              <a:rPr lang="en-US" sz="2200" dirty="0" smtClean="0"/>
+              <a:t>for the frequency tables:</a:t>
+            </a:r>
+            <a:endParaRPr lang="en-US" sz="2200" dirty="0" smtClean="0"/>
+          </a:p>
+          <a:p>
+            <a:pPr marL="0" indent="0">
+              <a:spcBef>
+                <a:spcPts val="800"/>
+              </a:spcBef>
+              <a:buNone/>
+            </a:pPr>
+            <a:r>
+              <a:rPr lang="en-US" sz="2200" dirty="0"/>
+              <a:t> </a:t>
+            </a:r>
+            <a:r>
+              <a:rPr lang="en-US" sz="2200" dirty="0" smtClean="0"/>
+              <a:t>a)    [a:1, b:2, c:3, d:7, e:16 ]</a:t>
+            </a:r>
+          </a:p>
+          <a:p>
+            <a:pPr marL="0" indent="0">
+              <a:spcBef>
+                <a:spcPts val="800"/>
+              </a:spcBef>
+              <a:buNone/>
+            </a:pPr>
+            <a:r>
+              <a:rPr lang="en-US" sz="2200" dirty="0"/>
+              <a:t> </a:t>
+            </a:r>
+            <a:r>
+              <a:rPr lang="en-US" sz="2200" dirty="0" smtClean="0"/>
+              <a:t>b</a:t>
+            </a:r>
+            <a:r>
+              <a:rPr lang="en-US" sz="2200" dirty="0" smtClean="0"/>
+              <a:t>)   </a:t>
+            </a:r>
+            <a:r>
+              <a:rPr lang="en-US" sz="2200" dirty="0" smtClean="0"/>
+              <a:t>[ </a:t>
+            </a:r>
+            <a:r>
+              <a:rPr lang="en-US" sz="2200" dirty="0" smtClean="0"/>
+              <a:t>a:3, b:4, c:2, d:4, e:7 ]</a:t>
+            </a:r>
+            <a:endParaRPr lang="en-US" sz="2200" dirty="0"/>
           </a:p>
           <a:p>
             <a:endParaRPr lang="en-US" sz="2400" dirty="0"/>
@@ -7105,7 +7368,7 @@
             </a:r>
             <a:fld id="{A9DEA08E-4CB3-E742-9AC2-43959A293033}" type="datetime4">
               <a:rPr lang="en-AU" smtClean="0"/>
-              <a:t>May 19, 2020</a:t>
+              <a:t>May 22, 2020</a:t>
             </a:fld>
             <a:endParaRPr lang="en-US" dirty="0"/>
           </a:p>
@@ -7242,8 +7505,8 @@
         </p:nvSpPr>
         <p:spPr>
           <a:xfrm>
-            <a:off x="265113" y="641787"/>
-            <a:ext cx="8623300" cy="4800600"/>
+            <a:off x="265113" y="641786"/>
+            <a:ext cx="8623300" cy="5633601"/>
           </a:xfrm>
         </p:spPr>
         <p:txBody>
@@ -7254,43 +7517,97 @@
               <a:buNone/>
             </a:pPr>
             <a:r>
-              <a:rPr lang="en-US" sz="2400" dirty="0" smtClean="0"/>
-              <a:t>Build Huffman code for [ a:3, b:4, c:2, d:4, e:7 ]</a:t>
+              <a:rPr lang="en-US" sz="2200" dirty="0" smtClean="0"/>
+              <a:t>So in building Huffman code, we:</a:t>
+            </a:r>
+          </a:p>
+          <a:p>
+            <a:r>
+              <a:rPr lang="en-US" sz="2200" dirty="0" smtClean="0"/>
+              <a:t>keep track at the current weights</a:t>
+            </a:r>
+          </a:p>
+          <a:p>
+            <a:r>
+              <a:rPr lang="en-US" sz="2200" dirty="0" smtClean="0"/>
+              <a:t>join 2 </a:t>
+            </a:r>
+            <a:r>
+              <a:rPr lang="en-US" sz="2200" i="1" dirty="0" smtClean="0"/>
+              <a:t>smallest weights</a:t>
+            </a:r>
+            <a:r>
+              <a:rPr lang="en-US" sz="2200" dirty="0" smtClean="0"/>
+              <a:t> into one weight, and continue until only one weight remains.</a:t>
             </a:r>
           </a:p>
           <a:p>
             <a:pPr marL="0" indent="0">
               <a:buNone/>
             </a:pPr>
-            <a:r>
-              <a:rPr lang="en-US" sz="2400" dirty="0" smtClean="0"/>
-              <a:t>Note: there are different versions of Huffman code, all we need to do is to choose a way and keep consistency. For instance:</a:t>
-            </a:r>
-          </a:p>
-          <a:p>
-            <a:r>
-              <a:rPr lang="en-US" sz="2400" dirty="0" smtClean="0"/>
-              <a:t>maintaining current weight/frequency table in increasing order, taking into account the alphabetic order</a:t>
-            </a:r>
-          </a:p>
-          <a:p>
-            <a:r>
-              <a:rPr lang="en-US" sz="2400" dirty="0" smtClean="0"/>
-              <a:t>always choosing the first 2 smallest weights to join</a:t>
-            </a:r>
-          </a:p>
-          <a:p>
-            <a:r>
-              <a:rPr lang="en-US" sz="2400" dirty="0" smtClean="0"/>
-              <a:t>when assigning code, always set 0 to the left, 1 to the right edge  </a:t>
-            </a:r>
-            <a:endParaRPr lang="en-US" sz="2400" dirty="0"/>
+            <a:endParaRPr lang="en-US" sz="2200" dirty="0" smtClean="0"/>
           </a:p>
           <a:p>
             <a:pPr marL="0" indent="0">
               <a:buNone/>
             </a:pPr>
-            <a:endParaRPr lang="en-US" sz="2400" dirty="0"/>
+            <a:r>
+              <a:rPr lang="en-US" sz="2200" dirty="0" smtClean="0"/>
+              <a:t>Note</a:t>
+            </a:r>
+            <a:r>
+              <a:rPr lang="en-US" sz="2200" dirty="0" smtClean="0"/>
+              <a:t>: there are different versions of Huffman code, all we need to do is to choose a way and keep consistency. For instance:</a:t>
+            </a:r>
+          </a:p>
+          <a:p>
+            <a:r>
+              <a:rPr lang="en-US" sz="2200" dirty="0" smtClean="0"/>
+              <a:t>when joining 2 weights into one, always make the smaller weight </a:t>
+            </a:r>
+            <a:r>
+              <a:rPr lang="en-US" sz="2200" dirty="0" smtClean="0"/>
+              <a:t>be</a:t>
+            </a:r>
+            <a:r>
+              <a:rPr lang="en-US" sz="2200" dirty="0" smtClean="0"/>
+              <a:t> the left child</a:t>
+            </a:r>
+          </a:p>
+          <a:p>
+            <a:r>
+              <a:rPr lang="en-US" sz="2200" dirty="0" smtClean="0"/>
+              <a:t>choose a consistent way for breaking ties</a:t>
+            </a:r>
+            <a:r>
+              <a:rPr lang="en-US" sz="2200" dirty="0" smtClean="0"/>
+              <a:t> </a:t>
+            </a:r>
+          </a:p>
+          <a:p>
+            <a:r>
+              <a:rPr lang="en-US" sz="2200" dirty="0" smtClean="0"/>
+              <a:t>when </a:t>
+            </a:r>
+            <a:r>
+              <a:rPr lang="en-US" sz="2200" dirty="0" smtClean="0"/>
+              <a:t>assigning code, always set 0 to the </a:t>
+            </a:r>
+            <a:r>
+              <a:rPr lang="en-US" sz="2200" dirty="0" smtClean="0"/>
+              <a:t>left edge, </a:t>
+            </a:r>
+            <a:r>
+              <a:rPr lang="en-US" sz="2200" dirty="0" smtClean="0"/>
+              <a:t>1 to the right edge  </a:t>
+            </a:r>
+            <a:endParaRPr lang="en-US" sz="2200" dirty="0"/>
+          </a:p>
+          <a:p>
+            <a:pPr marL="0" indent="0">
+              <a:buNone/>
+            </a:pPr>
+            <a:endParaRPr lang="en-US" sz="2200" dirty="0"/>
           </a:p>
         </p:txBody>
       </p:sp>
@@ -7318,7 +7635,7 @@
             </a:r>
             <a:fld id="{A9DEA08E-4CB3-E742-9AC2-43959A293033}" type="datetime4">
               <a:rPr lang="en-AU" smtClean="0"/>
-              <a:t>May 20, 2020</a:t>
+              <a:t>May 22, 2020</a:t>
             </a:fld>
             <a:endParaRPr lang="en-US" dirty="0"/>
           </a:p>
@@ -7455,8 +7772,8 @@
         </p:nvSpPr>
         <p:spPr>
           <a:xfrm>
-            <a:off x="293688" y="804129"/>
-            <a:ext cx="8623300" cy="4800600"/>
+            <a:off x="0" y="804129"/>
+            <a:ext cx="9144000" cy="4800600"/>
           </a:xfrm>
         </p:spPr>
         <p:txBody>
@@ -7467,19 +7784,19 @@
               <a:buNone/>
             </a:pPr>
             <a:r>
-              <a:rPr lang="en-US" sz="2400" dirty="0">
+              <a:rPr lang="en-US" sz="2200" dirty="0">
                 <a:effectLst/>
               </a:rPr>
               <a:t>Huffman’s Algorithm generates prefix-free code trees for a given set of symbol frequencies. Using these algorithms generate two code trees based on the frequencies in the following message: </a:t>
             </a:r>
-            <a:endParaRPr lang="en-US" sz="2400" dirty="0"/>
+            <a:endParaRPr lang="en-US" sz="2200" dirty="0"/>
           </a:p>
           <a:p>
             <a:pPr marL="0" indent="0" algn="ctr">
               <a:buNone/>
             </a:pPr>
             <a:r>
-              <a:rPr lang="en-US" sz="2400" dirty="0" err="1">
+              <a:rPr lang="en-US" sz="2200" dirty="0" err="1">
                 <a:solidFill>
                   <a:srgbClr val="080FAC"/>
                 </a:solidFill>
@@ -7490,12 +7807,12 @@
               <a:t>losslesscodes</a:t>
             </a:r>
             <a:r>
-              <a:rPr lang="en-US" sz="2400" dirty="0">
+              <a:rPr lang="en-US" sz="2200" dirty="0">
                 <a:effectLst/>
               </a:rPr>
               <a:t> </a:t>
             </a:r>
-            <a:endParaRPr lang="en-US" sz="2400" dirty="0" smtClean="0">
+            <a:endParaRPr lang="en-US" sz="2200" dirty="0" smtClean="0">
               <a:effectLst/>
             </a:endParaRPr>
           </a:p>
@@ -7504,18 +7821,18 @@
               <a:buNone/>
             </a:pPr>
             <a:r>
-              <a:rPr lang="en-US" sz="2400" dirty="0" smtClean="0">
+              <a:rPr lang="en-US" sz="2200" dirty="0" smtClean="0">
                 <a:effectLst/>
               </a:rPr>
               <a:t>What </a:t>
             </a:r>
             <a:r>
-              <a:rPr lang="en-US" sz="2400" dirty="0">
+              <a:rPr lang="en-US" sz="2200" dirty="0">
                 <a:effectLst/>
               </a:rPr>
               <a:t>is the total length of the compressed message using the Huffman code? </a:t>
             </a:r>
-            <a:endParaRPr lang="en-US" sz="2400" dirty="0"/>
+            <a:endParaRPr lang="en-US" sz="2200" dirty="0"/>
           </a:p>
           <a:p>
             <a:endParaRPr lang="en-US" sz="2400" dirty="0"/>
@@ -7546,7 +7863,7 @@
             </a:r>
             <a:fld id="{A9DEA08E-4CB3-E742-9AC2-43959A293033}" type="datetime4">
               <a:rPr lang="en-AU" smtClean="0"/>
-              <a:t>May 19, 2020</a:t>
+              <a:t>May 22, 2020</a:t>
             </a:fld>
             <a:endParaRPr lang="en-US" dirty="0"/>
           </a:p>
@@ -7814,7 +8131,7 @@
             </a:r>
             <a:fld id="{A9DEA08E-4CB3-E742-9AC2-43959A293033}" type="datetime4">
               <a:rPr lang="en-AU" smtClean="0"/>
-              <a:t>May 19, 2020</a:t>
+              <a:t>May 22, 2020</a:t>
             </a:fld>
             <a:endParaRPr lang="en-US" dirty="0"/>
           </a:p>
@@ -8132,7 +8449,7 @@
             </a:r>
             <a:fld id="{E580C3D6-5DAB-6F42-B766-88C06479D29F}" type="datetime4">
               <a:rPr lang="en-AU" smtClean="0"/>
-              <a:t>May 20, 2020</a:t>
+              <a:t>May 22, 2020</a:t>
             </a:fld>
             <a:endParaRPr lang="en-US" dirty="0"/>
           </a:p>

</xml_diff>